<commit_message>
practice mongodb insert & find methods
</commit_message>
<xml_diff>
--- a/MongoDB.pptx
+++ b/MongoDB.pptx
@@ -9420,7 +9420,7 @@
               <a:t>()  </a:t>
             </a:r>
             <a:r>
-              <a:rPr lang="en-US" sz="2000" dirty="0">
+              <a:rPr lang="en-US" sz="1600" dirty="0">
                 <a:solidFill>
                   <a:schemeClr val="bg1">
                     <a:lumMod val="95000"/>
@@ -9429,6 +9429,13 @@
               </a:rPr>
               <a:t>// It returns an Error</a:t>
             </a:r>
+            <a:endParaRPr lang="en-US" sz="2000" dirty="0">
+              <a:solidFill>
+                <a:schemeClr val="bg1">
+                  <a:lumMod val="95000"/>
+                </a:schemeClr>
+              </a:solidFill>
+            </a:endParaRPr>
           </a:p>
         </p:txBody>
       </p:sp>

</xml_diff>

<commit_message>
schema designed for mongodb
</commit_message>
<xml_diff>
--- a/MongoDB.pptx
+++ b/MongoDB.pptx
@@ -16,6 +16,7 @@
     <p:sldId id="262" r:id="rId10"/>
     <p:sldId id="266" r:id="rId11"/>
     <p:sldId id="267" r:id="rId12"/>
+    <p:sldId id="268" r:id="rId13"/>
   </p:sldIdLst>
   <p:sldSz cx="12192000" cy="6858000"/>
   <p:notesSz cx="6858000" cy="9144000"/>
@@ -3679,7 +3680,7 @@
           <a:p>
             <a:fld id="{96BF6615-5CFE-4B8E-BC20-4A44397F9CDD}" type="datetimeFigureOut">
               <a:rPr lang="en-US" smtClean="0"/>
-              <a:t>9/3/2024</a:t>
+              <a:t>9/9/2024</a:t>
             </a:fld>
             <a:endParaRPr lang="en-US" dirty="0"/>
           </a:p>
@@ -3877,7 +3878,7 @@
           <a:p>
             <a:fld id="{96BF6615-5CFE-4B8E-BC20-4A44397F9CDD}" type="datetimeFigureOut">
               <a:rPr lang="en-US" smtClean="0"/>
-              <a:t>9/3/2024</a:t>
+              <a:t>9/9/2024</a:t>
             </a:fld>
             <a:endParaRPr lang="en-US" dirty="0"/>
           </a:p>
@@ -4085,7 +4086,7 @@
           <a:p>
             <a:fld id="{96BF6615-5CFE-4B8E-BC20-4A44397F9CDD}" type="datetimeFigureOut">
               <a:rPr lang="en-US" smtClean="0"/>
-              <a:t>9/3/2024</a:t>
+              <a:t>9/9/2024</a:t>
             </a:fld>
             <a:endParaRPr lang="en-US" dirty="0"/>
           </a:p>
@@ -4283,7 +4284,7 @@
           <a:p>
             <a:fld id="{96BF6615-5CFE-4B8E-BC20-4A44397F9CDD}" type="datetimeFigureOut">
               <a:rPr lang="en-US" smtClean="0"/>
-              <a:t>9/3/2024</a:t>
+              <a:t>9/9/2024</a:t>
             </a:fld>
             <a:endParaRPr lang="en-US" dirty="0"/>
           </a:p>
@@ -4558,7 +4559,7 @@
           <a:p>
             <a:fld id="{96BF6615-5CFE-4B8E-BC20-4A44397F9CDD}" type="datetimeFigureOut">
               <a:rPr lang="en-US" smtClean="0"/>
-              <a:t>9/3/2024</a:t>
+              <a:t>9/9/2024</a:t>
             </a:fld>
             <a:endParaRPr lang="en-US" dirty="0"/>
           </a:p>
@@ -4823,7 +4824,7 @@
           <a:p>
             <a:fld id="{96BF6615-5CFE-4B8E-BC20-4A44397F9CDD}" type="datetimeFigureOut">
               <a:rPr lang="en-US" smtClean="0"/>
-              <a:t>9/3/2024</a:t>
+              <a:t>9/9/2024</a:t>
             </a:fld>
             <a:endParaRPr lang="en-US" dirty="0"/>
           </a:p>
@@ -5235,7 +5236,7 @@
           <a:p>
             <a:fld id="{96BF6615-5CFE-4B8E-BC20-4A44397F9CDD}" type="datetimeFigureOut">
               <a:rPr lang="en-US" smtClean="0"/>
-              <a:t>9/3/2024</a:t>
+              <a:t>9/9/2024</a:t>
             </a:fld>
             <a:endParaRPr lang="en-US" dirty="0"/>
           </a:p>
@@ -5376,7 +5377,7 @@
           <a:p>
             <a:fld id="{96BF6615-5CFE-4B8E-BC20-4A44397F9CDD}" type="datetimeFigureOut">
               <a:rPr lang="en-US" smtClean="0"/>
-              <a:t>9/3/2024</a:t>
+              <a:t>9/9/2024</a:t>
             </a:fld>
             <a:endParaRPr lang="en-US" dirty="0"/>
           </a:p>
@@ -5489,7 +5490,7 @@
           <a:p>
             <a:fld id="{96BF6615-5CFE-4B8E-BC20-4A44397F9CDD}" type="datetimeFigureOut">
               <a:rPr lang="en-US" smtClean="0"/>
-              <a:t>9/3/2024</a:t>
+              <a:t>9/9/2024</a:t>
             </a:fld>
             <a:endParaRPr lang="en-US" dirty="0"/>
           </a:p>
@@ -5800,7 +5801,7 @@
           <a:p>
             <a:fld id="{96BF6615-5CFE-4B8E-BC20-4A44397F9CDD}" type="datetimeFigureOut">
               <a:rPr lang="en-US" smtClean="0"/>
-              <a:t>9/3/2024</a:t>
+              <a:t>9/9/2024</a:t>
             </a:fld>
             <a:endParaRPr lang="en-US" dirty="0"/>
           </a:p>
@@ -6088,7 +6089,7 @@
           <a:p>
             <a:fld id="{96BF6615-5CFE-4B8E-BC20-4A44397F9CDD}" type="datetimeFigureOut">
               <a:rPr lang="en-US" smtClean="0"/>
-              <a:t>9/3/2024</a:t>
+              <a:t>9/9/2024</a:t>
             </a:fld>
             <a:endParaRPr lang="en-US" dirty="0"/>
           </a:p>
@@ -6329,7 +6330,7 @@
           <a:p>
             <a:fld id="{96BF6615-5CFE-4B8E-BC20-4A44397F9CDD}" type="datetimeFigureOut">
               <a:rPr lang="en-US" smtClean="0"/>
-              <a:t>9/3/2024</a:t>
+              <a:t>9/9/2024</a:t>
             </a:fld>
             <a:endParaRPr lang="en-US" dirty="0"/>
           </a:p>
@@ -7537,6 +7538,135 @@
 </p:sld>
 </file>
 
+<file path=ppt/slides/slide12.xml><?xml version="1.0" encoding="utf-8"?>
+<p:sld xmlns:a="http://schemas.openxmlformats.org/drawingml/2006/main" xmlns:r="http://schemas.openxmlformats.org/officeDocument/2006/relationships" xmlns:p="http://schemas.openxmlformats.org/presentationml/2006/main">
+  <p:cSld>
+    <p:bg>
+      <p:bgPr>
+        <a:solidFill>
+          <a:srgbClr val="040E1A"/>
+        </a:solidFill>
+        <a:effectLst/>
+      </p:bgPr>
+    </p:bg>
+    <p:spTree>
+      <p:nvGrpSpPr>
+        <p:cNvPr id="1" name=""/>
+        <p:cNvGrpSpPr/>
+        <p:nvPr/>
+      </p:nvGrpSpPr>
+      <p:grpSpPr>
+        <a:xfrm>
+          <a:off x="0" y="0"/>
+          <a:ext cx="0" cy="0"/>
+          <a:chOff x="0" y="0"/>
+          <a:chExt cx="0" cy="0"/>
+        </a:xfrm>
+      </p:grpSpPr>
+      <p:sp>
+        <p:nvSpPr>
+          <p:cNvPr id="2" name="Title 1">
+            <a:extLst>
+              <a:ext uri="{FF2B5EF4-FFF2-40B4-BE49-F238E27FC236}">
+                <a16:creationId xmlns:a16="http://schemas.microsoft.com/office/drawing/2014/main" id="{CF10AB08-2AE1-487B-8E88-BEDF82D22428}"/>
+              </a:ext>
+            </a:extLst>
+          </p:cNvPr>
+          <p:cNvSpPr>
+            <a:spLocks noGrp="1"/>
+          </p:cNvSpPr>
+          <p:nvPr>
+            <p:ph type="title"/>
+          </p:nvPr>
+        </p:nvSpPr>
+        <p:spPr/>
+        <p:txBody>
+          <a:bodyPr/>
+          <a:lstStyle/>
+          <a:p>
+            <a:r>
+              <a:rPr lang="en-US" dirty="0">
+                <a:solidFill>
+                  <a:srgbClr val="00B050"/>
+                </a:solidFill>
+              </a:rPr>
+              <a:t>DB</a:t>
+            </a:r>
+            <a:r>
+              <a:rPr lang="en-US">
+                <a:solidFill>
+                  <a:srgbClr val="00B050"/>
+                </a:solidFill>
+              </a:rPr>
+              <a:t>: </a:t>
+            </a:r>
+            <a:r>
+              <a:rPr lang="en-US">
+                <a:solidFill>
+                  <a:schemeClr val="bg1">
+                    <a:lumMod val="95000"/>
+                  </a:schemeClr>
+                </a:solidFill>
+              </a:rPr>
+              <a:t>Data type</a:t>
+            </a:r>
+            <a:endParaRPr lang="en-US" dirty="0">
+              <a:solidFill>
+                <a:schemeClr val="bg1">
+                  <a:lumMod val="95000"/>
+                </a:schemeClr>
+              </a:solidFill>
+            </a:endParaRPr>
+          </a:p>
+        </p:txBody>
+      </p:sp>
+      <p:sp>
+        <p:nvSpPr>
+          <p:cNvPr id="3" name="Content Placeholder 2">
+            <a:extLst>
+              <a:ext uri="{FF2B5EF4-FFF2-40B4-BE49-F238E27FC236}">
+                <a16:creationId xmlns:a16="http://schemas.microsoft.com/office/drawing/2014/main" id="{1E56B40A-B234-4B8B-9AAF-C52FDD440812}"/>
+              </a:ext>
+            </a:extLst>
+          </p:cNvPr>
+          <p:cNvSpPr>
+            <a:spLocks noGrp="1"/>
+          </p:cNvSpPr>
+          <p:nvPr>
+            <p:ph idx="1"/>
+          </p:nvPr>
+        </p:nvSpPr>
+        <p:spPr/>
+        <p:txBody>
+          <a:bodyPr>
+            <a:normAutofit/>
+          </a:bodyPr>
+          <a:lstStyle/>
+          <a:p>
+            <a:pPr marL="0" indent="0">
+              <a:buNone/>
+            </a:pPr>
+            <a:endParaRPr lang="en-US" sz="1600" dirty="0">
+              <a:solidFill>
+                <a:srgbClr val="00B050"/>
+              </a:solidFill>
+            </a:endParaRPr>
+          </a:p>
+        </p:txBody>
+      </p:sp>
+    </p:spTree>
+    <p:extLst>
+      <p:ext uri="{BB962C8B-B14F-4D97-AF65-F5344CB8AC3E}">
+        <p14:creationId xmlns:p14="http://schemas.microsoft.com/office/powerpoint/2010/main" val="4106471187"/>
+      </p:ext>
+    </p:extLst>
+  </p:cSld>
+  <p:clrMapOvr>
+    <a:masterClrMapping/>
+  </p:clrMapOvr>
+</p:sld>
+</file>
+
 <file path=ppt/slides/slide2.xml><?xml version="1.0" encoding="utf-8"?>
 <p:sld xmlns:a="http://schemas.openxmlformats.org/drawingml/2006/main" xmlns:r="http://schemas.openxmlformats.org/officeDocument/2006/relationships" xmlns:p="http://schemas.openxmlformats.org/presentationml/2006/main">
   <p:cSld>

</xml_diff>